<commit_message>
[#3] Documents explaining AWS is added.
</commit_message>
<xml_diff>
--- a/docs/images/aws_structure.pptx
+++ b/docs/images/aws_structure.pptx
@@ -3663,6 +3663,261 @@
           </a:p>
         </p:txBody>
       </p:sp>
+      <p:sp>
+        <p:nvSpPr>
+          <p:cNvPr id="16" name="Rounded Rectangle 15"/>
+          <p:cNvSpPr/>
+          <p:nvPr/>
+        </p:nvSpPr>
+        <p:spPr>
+          <a:xfrm>
+            <a:off x="152487" y="5275597"/>
+            <a:ext cx="2115700" cy="689178"/>
+          </a:xfrm>
+          <a:prstGeom prst="roundRect">
+            <a:avLst/>
+          </a:prstGeom>
+        </p:spPr>
+        <p:style>
+          <a:lnRef idx="2">
+            <a:schemeClr val="accent6"/>
+          </a:lnRef>
+          <a:fillRef idx="1">
+            <a:schemeClr val="lt1"/>
+          </a:fillRef>
+          <a:effectRef idx="0">
+            <a:schemeClr val="accent6"/>
+          </a:effectRef>
+          <a:fontRef idx="minor">
+            <a:schemeClr val="dk1"/>
+          </a:fontRef>
+        </p:style>
+        <p:txBody>
+          <a:bodyPr rot="0" spcFirstLastPara="0" vertOverflow="overflow" horzOverflow="overflow" vert="horz" wrap="square" lIns="91440" tIns="45720" rIns="91440" bIns="45720" numCol="1" spcCol="0" rtlCol="0" fromWordArt="0" anchor="ctr" anchorCtr="0" forceAA="0" compatLnSpc="1">
+            <a:prstTxWarp prst="textNoShape">
+              <a:avLst/>
+            </a:prstTxWarp>
+            <a:noAutofit/>
+          </a:bodyPr>
+          <a:lstStyle/>
+          <a:p>
+            <a:pPr algn="ctr"/>
+            <a:r>
+              <a:rPr lang="en-US" sz="1400" b="1" dirty="0">
+                <a:latin typeface="Apple SD Gothic Neo Light" charset="-127"/>
+                <a:ea typeface="Apple SD Gothic Neo Light" charset="-127"/>
+                <a:cs typeface="Apple SD Gothic Neo Light" charset="-127"/>
+              </a:rPr>
+              <a:t>S3</a:t>
+            </a:r>
+          </a:p>
+          <a:p>
+            <a:pPr algn="ctr"/>
+            <a:r>
+              <a:rPr lang="en-US" sz="1400" dirty="0" smtClean="0">
+                <a:latin typeface="Apple SD Gothic Neo Light" charset="-127"/>
+                <a:ea typeface="Apple SD Gothic Neo Light" charset="-127"/>
+                <a:cs typeface="Apple SD Gothic Neo Light" charset="-127"/>
+              </a:rPr>
+              <a:t>cdn.</a:t>
+            </a:r>
+            <a:r>
+              <a:rPr lang="en-US" sz="1400" dirty="0" smtClean="0">
+                <a:latin typeface="Apple SD Gothic Neo Light" charset="-127"/>
+                <a:ea typeface="Apple SD Gothic Neo Light" charset="-127"/>
+                <a:cs typeface="Apple SD Gothic Neo Light" charset="-127"/>
+              </a:rPr>
+              <a:t>myeongjae.kim.s3...</a:t>
+            </a:r>
+            <a:endParaRPr lang="en-US" sz="1400" dirty="0">
+              <a:latin typeface="Apple SD Gothic Neo Light" charset="-127"/>
+              <a:ea typeface="Apple SD Gothic Neo Light" charset="-127"/>
+              <a:cs typeface="Apple SD Gothic Neo Light" charset="-127"/>
+            </a:endParaRPr>
+          </a:p>
+        </p:txBody>
+      </p:sp>
+      <p:sp>
+        <p:nvSpPr>
+          <p:cNvPr id="20" name="Rounded Rectangle 19"/>
+          <p:cNvSpPr/>
+          <p:nvPr/>
+        </p:nvSpPr>
+        <p:spPr>
+          <a:xfrm>
+            <a:off x="357774" y="4168881"/>
+            <a:ext cx="1699972" cy="712151"/>
+          </a:xfrm>
+          <a:prstGeom prst="roundRect">
+            <a:avLst/>
+          </a:prstGeom>
+        </p:spPr>
+        <p:style>
+          <a:lnRef idx="2">
+            <a:schemeClr val="accent6"/>
+          </a:lnRef>
+          <a:fillRef idx="1">
+            <a:schemeClr val="lt1"/>
+          </a:fillRef>
+          <a:effectRef idx="0">
+            <a:schemeClr val="accent6"/>
+          </a:effectRef>
+          <a:fontRef idx="minor">
+            <a:schemeClr val="dk1"/>
+          </a:fontRef>
+        </p:style>
+        <p:txBody>
+          <a:bodyPr rot="0" spcFirstLastPara="0" vertOverflow="overflow" horzOverflow="overflow" vert="horz" wrap="square" lIns="91440" tIns="45720" rIns="91440" bIns="45720" numCol="1" spcCol="0" rtlCol="0" fromWordArt="0" anchor="ctr" anchorCtr="0" forceAA="0" compatLnSpc="1">
+            <a:prstTxWarp prst="textNoShape">
+              <a:avLst/>
+            </a:prstTxWarp>
+            <a:noAutofit/>
+          </a:bodyPr>
+          <a:lstStyle/>
+          <a:p>
+            <a:pPr algn="ctr"/>
+            <a:r>
+              <a:rPr lang="en-US" sz="1400" b="1" dirty="0" err="1">
+                <a:latin typeface="Apple SD Gothic Neo Light" charset="-127"/>
+                <a:ea typeface="Apple SD Gothic Neo Light" charset="-127"/>
+                <a:cs typeface="Apple SD Gothic Neo Light" charset="-127"/>
+              </a:rPr>
+              <a:t>CloudFront</a:t>
+            </a:r>
+            <a:endParaRPr lang="en-US" sz="1400" b="1" dirty="0">
+              <a:latin typeface="Apple SD Gothic Neo Light" charset="-127"/>
+              <a:ea typeface="Apple SD Gothic Neo Light" charset="-127"/>
+              <a:cs typeface="Apple SD Gothic Neo Light" charset="-127"/>
+            </a:endParaRPr>
+          </a:p>
+          <a:p>
+            <a:pPr algn="ctr"/>
+            <a:r>
+              <a:rPr lang="en-US" sz="1400" dirty="0" err="1" smtClean="0">
+                <a:latin typeface="Apple SD Gothic Neo Light" charset="-127"/>
+                <a:ea typeface="Apple SD Gothic Neo Light" charset="-127"/>
+                <a:cs typeface="Apple SD Gothic Neo Light" charset="-127"/>
+              </a:rPr>
+              <a:t>cdn.myeongjae.kim</a:t>
+            </a:r>
+            <a:endParaRPr lang="en-US" sz="1400" dirty="0">
+              <a:latin typeface="Apple SD Gothic Neo Light" charset="-127"/>
+              <a:ea typeface="Apple SD Gothic Neo Light" charset="-127"/>
+              <a:cs typeface="Apple SD Gothic Neo Light" charset="-127"/>
+            </a:endParaRPr>
+          </a:p>
+        </p:txBody>
+      </p:sp>
+      <p:cxnSp>
+        <p:nvCxnSpPr>
+          <p:cNvPr id="22" name="Straight Arrow Connector 21"/>
+          <p:cNvCxnSpPr>
+            <a:stCxn id="20" idx="2"/>
+            <a:endCxn id="16" idx="0"/>
+          </p:cNvCxnSpPr>
+          <p:nvPr/>
+        </p:nvCxnSpPr>
+        <p:spPr>
+          <a:xfrm>
+            <a:off x="1207760" y="4881032"/>
+            <a:ext cx="2577" cy="394565"/>
+          </a:xfrm>
+          <a:prstGeom prst="straightConnector1">
+            <a:avLst/>
+          </a:prstGeom>
+          <a:ln>
+            <a:tailEnd type="triangle"/>
+          </a:ln>
+        </p:spPr>
+        <p:style>
+          <a:lnRef idx="1">
+            <a:schemeClr val="accent1"/>
+          </a:lnRef>
+          <a:fillRef idx="0">
+            <a:schemeClr val="accent1"/>
+          </a:fillRef>
+          <a:effectRef idx="0">
+            <a:schemeClr val="accent1"/>
+          </a:effectRef>
+          <a:fontRef idx="minor">
+            <a:schemeClr val="tx1"/>
+          </a:fontRef>
+        </p:style>
+      </p:cxnSp>
+      <p:cxnSp>
+        <p:nvCxnSpPr>
+          <p:cNvPr id="24" name="Straight Arrow Connector 23"/>
+          <p:cNvCxnSpPr>
+            <a:stCxn id="5" idx="2"/>
+            <a:endCxn id="20" idx="0"/>
+          </p:cNvCxnSpPr>
+          <p:nvPr/>
+        </p:nvCxnSpPr>
+        <p:spPr>
+          <a:xfrm flipH="1">
+            <a:off x="1207760" y="3025090"/>
+            <a:ext cx="370160" cy="1143791"/>
+          </a:xfrm>
+          <a:prstGeom prst="straightConnector1">
+            <a:avLst/>
+          </a:prstGeom>
+          <a:ln>
+            <a:tailEnd type="triangle"/>
+          </a:ln>
+        </p:spPr>
+        <p:style>
+          <a:lnRef idx="1">
+            <a:schemeClr val="accent1"/>
+          </a:lnRef>
+          <a:fillRef idx="0">
+            <a:schemeClr val="accent1"/>
+          </a:fillRef>
+          <a:effectRef idx="0">
+            <a:schemeClr val="accent1"/>
+          </a:effectRef>
+          <a:fontRef idx="minor">
+            <a:schemeClr val="tx1"/>
+          </a:fontRef>
+        </p:style>
+      </p:cxnSp>
+      <p:sp>
+        <p:nvSpPr>
+          <p:cNvPr id="25" name="TextBox 24"/>
+          <p:cNvSpPr txBox="1"/>
+          <p:nvPr/>
+        </p:nvSpPr>
+        <p:spPr>
+          <a:xfrm>
+            <a:off x="193287" y="3529483"/>
+            <a:ext cx="1205779" cy="307777"/>
+          </a:xfrm>
+          <a:prstGeom prst="rect">
+            <a:avLst/>
+          </a:prstGeom>
+          <a:noFill/>
+        </p:spPr>
+        <p:txBody>
+          <a:bodyPr wrap="none" rtlCol="0">
+            <a:spAutoFit/>
+          </a:bodyPr>
+          <a:lstStyle/>
+          <a:p>
+            <a:r>
+              <a:rPr lang="en-US" sz="1400" smtClean="0">
+                <a:latin typeface="Apple SD Gothic Neo Light" charset="-127"/>
+                <a:ea typeface="Apple SD Gothic Neo Light" charset="-127"/>
+                <a:cs typeface="Apple SD Gothic Neo Light" charset="-127"/>
+              </a:rPr>
+              <a:t>Get resources</a:t>
+            </a:r>
+            <a:endParaRPr lang="en-US" sz="1400" dirty="0">
+              <a:latin typeface="Apple SD Gothic Neo Light" charset="-127"/>
+              <a:ea typeface="Apple SD Gothic Neo Light" charset="-127"/>
+              <a:cs typeface="Apple SD Gothic Neo Light" charset="-127"/>
+            </a:endParaRPr>
+          </a:p>
+        </p:txBody>
+      </p:sp>
     </p:spTree>
     <p:extLst>
       <p:ext uri="{BB962C8B-B14F-4D97-AF65-F5344CB8AC3E}">

</xml_diff>